<commit_message>
small changes to exam 1 review slides
</commit_message>
<xml_diff>
--- a/SampleExams/Exam1Review.pptx
+++ b/SampleExams/Exam1Review.pptx
@@ -4994,7 +4994,7 @@
       </p:grpSpPr>
       <p:sp>
         <p:nvSpPr>
-          <p:cNvPr id="195" name="For written part, go through in-class quizzes, slides and Daily Topic Summaries…"/>
+          <p:cNvPr id="195" name="For written part, go through in-class quizzes, slides and Daily Topic Summaries and Design Problems…"/>
           <p:cNvSpPr txBox="1"/>
           <p:nvPr>
             <p:ph type="body" idx="1"/>
@@ -5011,23 +5011,25 @@
           <a:p>
             <a:pPr/>
             <a:r>
-              <a:t>For written part, go through in-class quizzes, slides and Daily Topic Summaries</a:t>
-            </a:r>
-          </a:p>
-          <a:p>
-            <a:pPr/>
-          </a:p>
-          <a:p>
-            <a:pPr/>
-          </a:p>
-          <a:p>
-            <a:pPr/>
-            <a:r>
-              <a:t>For programming part, review previous homework, in-class coding exercises</a:t>
-            </a:r>
-          </a:p>
-          <a:p>
-            <a:pPr/>
+              <a:t>For written part, go through in-class quizzes, slides and Daily Topic Summaries and Design Problems</a:t>
+            </a:r>
+          </a:p>
+          <a:p>
+            <a:pPr/>
+          </a:p>
+          <a:p>
+            <a:pPr/>
+          </a:p>
+          <a:p>
+            <a:pPr/>
+            <a:r>
+              <a:t>For programming part, review previous homework assignments and in-class coding exercises</a:t>
+            </a:r>
+          </a:p>
+          <a:p>
+            <a:pPr>
+              <a:defRPr u="sng"/>
+            </a:pPr>
             <a:r>
               <a:t>BEST review source is previous Sample Exams</a:t>
             </a:r>

</xml_diff>